<commit_message>
Deployed f67ff14 with MkDocs version: 1.1.2
</commit_message>
<xml_diff>
--- a/Scratch-Figures.pptx
+++ b/Scratch-Figures.pptx
@@ -9,6 +9,8 @@
     <p:sldId id="257" r:id="rId3"/>
     <p:sldId id="258" r:id="rId4"/>
     <p:sldId id="259" r:id="rId5"/>
+    <p:sldId id="260" r:id="rId6"/>
+    <p:sldId id="261" r:id="rId7"/>
   </p:sldIdLst>
   <p:sldSz cx="12192000" cy="6858000"/>
   <p:notesSz cx="6858000" cy="9144000"/>
@@ -3340,14 +3342,19 @@
             <p:ph type="ctrTitle"/>
           </p:nvPr>
         </p:nvSpPr>
-        <p:spPr/>
+        <p:spPr>
+          <a:xfrm>
+            <a:off x="1434548" y="898766"/>
+            <a:ext cx="9144000" cy="1402867"/>
+          </a:xfrm>
+        </p:spPr>
         <p:txBody>
           <a:bodyPr/>
           <a:lstStyle/>
           <a:p>
             <a:r>
               <a:rPr lang="en-US" dirty="0"/>
-              <a:t>Scratch Figures</a:t>
+              <a:t>Scratch Annotated Figures</a:t>
             </a:r>
           </a:p>
         </p:txBody>
@@ -3368,12 +3375,78 @@
             <p:ph type="subTitle" idx="1"/>
           </p:nvPr>
         </p:nvSpPr>
-        <p:spPr/>
-        <p:txBody>
-          <a:bodyPr/>
-          <a:lstStyle/>
-          <a:p>
-            <a:endParaRPr lang="en-US"/>
+        <p:spPr>
+          <a:xfrm>
+            <a:off x="1308339" y="3021227"/>
+            <a:ext cx="9575322" cy="2530234"/>
+          </a:xfrm>
+        </p:spPr>
+        <p:txBody>
+          <a:bodyPr>
+            <a:noAutofit/>
+          </a:bodyPr>
+          <a:lstStyle/>
+          <a:p>
+            <a:pPr algn="l">
+              <a:lnSpc>
+                <a:spcPct val="100000"/>
+              </a:lnSpc>
+              <a:spcAft>
+                <a:spcPts val="600"/>
+              </a:spcAft>
+            </a:pPr>
+            <a:r>
+              <a:rPr lang="en-US" sz="1600" dirty="0"/>
+              <a:t>These are screen captures off the Scratch site with annotations added in PowerPoint.  After we add the annotations, we then do another screen capture and save the images to the $HOME/docs/</a:t>
+            </a:r>
+            <a:r>
+              <a:rPr lang="en-US" sz="1600" dirty="0" err="1"/>
+              <a:t>img</a:t>
+            </a:r>
+            <a:r>
+              <a:rPr lang="en-US" sz="1600" dirty="0"/>
+              <a:t> folder.  We then reference the images using the following relative image Markdown format:</a:t>
+            </a:r>
+          </a:p>
+          <a:p>
+            <a:pPr algn="l">
+              <a:lnSpc>
+                <a:spcPct val="170000"/>
+              </a:lnSpc>
+              <a:spcAft>
+                <a:spcPts val="600"/>
+              </a:spcAft>
+            </a:pPr>
+            <a:r>
+              <a:rPr lang="en-US" sz="1600" dirty="0">
+                <a:latin typeface="Courier" pitchFamily="2" charset="0"/>
+              </a:rPr>
+              <a:t>![Image Label](../</a:t>
+            </a:r>
+            <a:r>
+              <a:rPr lang="en-US" sz="1600" dirty="0" err="1">
+                <a:latin typeface="Courier" pitchFamily="2" charset="0"/>
+              </a:rPr>
+              <a:t>img</a:t>
+            </a:r>
+            <a:r>
+              <a:rPr lang="en-US" sz="1600" dirty="0">
+                <a:latin typeface="Courier" pitchFamily="2" charset="0"/>
+              </a:rPr>
+              <a:t>/</a:t>
+            </a:r>
+            <a:r>
+              <a:rPr lang="en-US" sz="1600" dirty="0" err="1">
+                <a:latin typeface="Courier" pitchFamily="2" charset="0"/>
+              </a:rPr>
+              <a:t>filename.png</a:t>
+            </a:r>
+            <a:r>
+              <a:rPr lang="en-US" sz="1600" dirty="0">
+                <a:latin typeface="Courier" pitchFamily="2" charset="0"/>
+              </a:rPr>
+              <a:t>)</a:t>
+            </a:r>
           </a:p>
         </p:txBody>
       </p:sp>
@@ -3909,8 +3982,8 @@
         </p:nvSpPr>
         <p:spPr>
           <a:xfrm>
-            <a:off x="5758248" y="1825625"/>
-            <a:ext cx="5595551" cy="4351338"/>
+            <a:off x="7376984" y="1825625"/>
+            <a:ext cx="3976815" cy="4351338"/>
           </a:xfrm>
         </p:spPr>
         <p:txBody>
@@ -3943,8 +4016,8 @@
         </p:blipFill>
         <p:spPr>
           <a:xfrm>
-            <a:off x="2443548" y="944563"/>
-            <a:ext cx="3314700" cy="5232400"/>
+            <a:off x="2104790" y="1906785"/>
+            <a:ext cx="2566670" cy="4051601"/>
           </a:xfrm>
           <a:prstGeom prst="rect">
             <a:avLst/>
@@ -4062,10 +4135,625 @@
           </a:p>
         </p:txBody>
       </p:sp>
+      <p:sp>
+        <p:nvSpPr>
+          <p:cNvPr id="7" name="Right Arrow 6">
+            <a:extLst>
+              <a:ext uri="{FF2B5EF4-FFF2-40B4-BE49-F238E27FC236}">
+                <a16:creationId xmlns:a16="http://schemas.microsoft.com/office/drawing/2014/main" id="{F2E540B2-A423-6A4E-80A2-4BE31FAA1005}"/>
+              </a:ext>
+            </a:extLst>
+          </p:cNvPr>
+          <p:cNvSpPr/>
+          <p:nvPr/>
+        </p:nvSpPr>
+        <p:spPr>
+          <a:xfrm rot="10800000">
+            <a:off x="4129215" y="2619896"/>
+            <a:ext cx="685800" cy="327992"/>
+          </a:xfrm>
+          <a:prstGeom prst="rightArrow">
+            <a:avLst/>
+          </a:prstGeom>
+          <a:solidFill>
+            <a:srgbClr val="FF0000"/>
+          </a:solidFill>
+          <a:ln>
+            <a:noFill/>
+          </a:ln>
+        </p:spPr>
+        <p:style>
+          <a:lnRef idx="2">
+            <a:schemeClr val="accent1">
+              <a:shade val="50000"/>
+            </a:schemeClr>
+          </a:lnRef>
+          <a:fillRef idx="1">
+            <a:schemeClr val="accent1"/>
+          </a:fillRef>
+          <a:effectRef idx="0">
+            <a:schemeClr val="accent1"/>
+          </a:effectRef>
+          <a:fontRef idx="minor">
+            <a:schemeClr val="lt1"/>
+          </a:fontRef>
+        </p:style>
+        <p:txBody>
+          <a:bodyPr rtlCol="0" anchor="ctr"/>
+          <a:lstStyle/>
+          <a:p>
+            <a:pPr algn="ctr"/>
+            <a:endParaRPr lang="en-US"/>
+          </a:p>
+        </p:txBody>
+      </p:sp>
+      <p:sp>
+        <p:nvSpPr>
+          <p:cNvPr id="8" name="TextBox 7">
+            <a:extLst>
+              <a:ext uri="{FF2B5EF4-FFF2-40B4-BE49-F238E27FC236}">
+                <a16:creationId xmlns:a16="http://schemas.microsoft.com/office/drawing/2014/main" id="{B886BB1E-F9AC-E345-BDAD-5C80D5AC364D}"/>
+              </a:ext>
+            </a:extLst>
+          </p:cNvPr>
+          <p:cNvSpPr txBox="1"/>
+          <p:nvPr/>
+        </p:nvSpPr>
+        <p:spPr>
+          <a:xfrm>
+            <a:off x="4858523" y="2460726"/>
+            <a:ext cx="2187843" cy="646331"/>
+          </a:xfrm>
+          <a:prstGeom prst="rect">
+            <a:avLst/>
+          </a:prstGeom>
+          <a:noFill/>
+        </p:spPr>
+        <p:txBody>
+          <a:bodyPr wrap="none" rtlCol="0">
+            <a:spAutoFit/>
+          </a:bodyPr>
+          <a:lstStyle/>
+          <a:p>
+            <a:r>
+              <a:rPr lang="en-US" dirty="0">
+                <a:solidFill>
+                  <a:srgbClr val="FF0000"/>
+                </a:solidFill>
+              </a:rPr>
+              <a:t>Click Here To</a:t>
+            </a:r>
+          </a:p>
+          <a:p>
+            <a:r>
+              <a:rPr lang="en-US" dirty="0">
+                <a:solidFill>
+                  <a:srgbClr val="FF0000"/>
+                </a:solidFill>
+              </a:rPr>
+              <a:t>Make A New Variable</a:t>
+            </a:r>
+          </a:p>
+        </p:txBody>
+      </p:sp>
     </p:spTree>
     <p:extLst>
       <p:ext uri="{BB962C8B-B14F-4D97-AF65-F5344CB8AC3E}">
         <p14:creationId xmlns:p14="http://schemas.microsoft.com/office/powerpoint/2010/main" val="3035791886"/>
+      </p:ext>
+    </p:extLst>
+  </p:cSld>
+  <p:clrMapOvr>
+    <a:masterClrMapping/>
+  </p:clrMapOvr>
+</p:sld>
+</file>
+
+<file path=ppt/slides/slide5.xml><?xml version="1.0" encoding="utf-8"?>
+<p:sld xmlns:a="http://schemas.openxmlformats.org/drawingml/2006/main" xmlns:r="http://schemas.openxmlformats.org/officeDocument/2006/relationships" xmlns:p="http://schemas.openxmlformats.org/presentationml/2006/main">
+  <p:cSld>
+    <p:spTree>
+      <p:nvGrpSpPr>
+        <p:cNvPr id="1" name=""/>
+        <p:cNvGrpSpPr/>
+        <p:nvPr/>
+      </p:nvGrpSpPr>
+      <p:grpSpPr>
+        <a:xfrm>
+          <a:off x="0" y="0"/>
+          <a:ext cx="0" cy="0"/>
+          <a:chOff x="0" y="0"/>
+          <a:chExt cx="0" cy="0"/>
+        </a:xfrm>
+      </p:grpSpPr>
+      <p:sp>
+        <p:nvSpPr>
+          <p:cNvPr id="2" name="Title 1">
+            <a:extLst>
+              <a:ext uri="{FF2B5EF4-FFF2-40B4-BE49-F238E27FC236}">
+                <a16:creationId xmlns:a16="http://schemas.microsoft.com/office/drawing/2014/main" id="{D3DF461F-29A7-5C42-A66A-ED0E1627719C}"/>
+              </a:ext>
+            </a:extLst>
+          </p:cNvPr>
+          <p:cNvSpPr>
+            <a:spLocks noGrp="1"/>
+          </p:cNvSpPr>
+          <p:nvPr>
+            <p:ph type="title"/>
+          </p:nvPr>
+        </p:nvSpPr>
+        <p:spPr/>
+        <p:txBody>
+          <a:bodyPr/>
+          <a:lstStyle/>
+          <a:p>
+            <a:endParaRPr lang="en-US"/>
+          </a:p>
+        </p:txBody>
+      </p:sp>
+      <p:sp>
+        <p:nvSpPr>
+          <p:cNvPr id="3" name="Content Placeholder 2">
+            <a:extLst>
+              <a:ext uri="{FF2B5EF4-FFF2-40B4-BE49-F238E27FC236}">
+                <a16:creationId xmlns:a16="http://schemas.microsoft.com/office/drawing/2014/main" id="{2C1FC446-A12B-4E42-BDB2-32646F57E2E6}"/>
+              </a:ext>
+            </a:extLst>
+          </p:cNvPr>
+          <p:cNvSpPr>
+            <a:spLocks noGrp="1"/>
+          </p:cNvSpPr>
+          <p:nvPr>
+            <p:ph idx="1"/>
+          </p:nvPr>
+        </p:nvSpPr>
+        <p:spPr>
+          <a:xfrm>
+            <a:off x="6685004" y="1825625"/>
+            <a:ext cx="4668795" cy="4351338"/>
+          </a:xfrm>
+        </p:spPr>
+        <p:txBody>
+          <a:bodyPr/>
+          <a:lstStyle/>
+          <a:p>
+            <a:endParaRPr lang="en-US" dirty="0"/>
+          </a:p>
+        </p:txBody>
+      </p:sp>
+      <p:pic>
+        <p:nvPicPr>
+          <p:cNvPr id="5" name="Picture 4">
+            <a:extLst>
+              <a:ext uri="{FF2B5EF4-FFF2-40B4-BE49-F238E27FC236}">
+                <a16:creationId xmlns:a16="http://schemas.microsoft.com/office/drawing/2014/main" id="{D87C3B38-BD6A-264F-B4CD-D9498A05BD69}"/>
+              </a:ext>
+            </a:extLst>
+          </p:cNvPr>
+          <p:cNvPicPr>
+            <a:picLocks noChangeAspect="1"/>
+          </p:cNvPicPr>
+          <p:nvPr/>
+        </p:nvPicPr>
+        <p:blipFill>
+          <a:blip r:embed="rId2"/>
+          <a:stretch>
+            <a:fillRect/>
+          </a:stretch>
+        </p:blipFill>
+        <p:spPr>
+          <a:xfrm>
+            <a:off x="1393780" y="2250817"/>
+            <a:ext cx="4702220" cy="1999907"/>
+          </a:xfrm>
+          <a:prstGeom prst="rect">
+            <a:avLst/>
+          </a:prstGeom>
+        </p:spPr>
+      </p:pic>
+      <p:sp>
+        <p:nvSpPr>
+          <p:cNvPr id="6" name="Right Arrow 5">
+            <a:extLst>
+              <a:ext uri="{FF2B5EF4-FFF2-40B4-BE49-F238E27FC236}">
+                <a16:creationId xmlns:a16="http://schemas.microsoft.com/office/drawing/2014/main" id="{2BB58786-882B-C24F-A878-1B50561398E6}"/>
+              </a:ext>
+            </a:extLst>
+          </p:cNvPr>
+          <p:cNvSpPr/>
+          <p:nvPr/>
+        </p:nvSpPr>
+        <p:spPr>
+          <a:xfrm rot="1313835">
+            <a:off x="2272383" y="3372151"/>
+            <a:ext cx="2499189" cy="319388"/>
+          </a:xfrm>
+          <a:prstGeom prst="rightArrow">
+            <a:avLst/>
+          </a:prstGeom>
+          <a:solidFill>
+            <a:srgbClr val="FF0000"/>
+          </a:solidFill>
+          <a:ln>
+            <a:noFill/>
+          </a:ln>
+        </p:spPr>
+        <p:style>
+          <a:lnRef idx="2">
+            <a:schemeClr val="accent1">
+              <a:shade val="50000"/>
+            </a:schemeClr>
+          </a:lnRef>
+          <a:fillRef idx="1">
+            <a:schemeClr val="accent1"/>
+          </a:fillRef>
+          <a:effectRef idx="0">
+            <a:schemeClr val="accent1"/>
+          </a:effectRef>
+          <a:fontRef idx="minor">
+            <a:schemeClr val="lt1"/>
+          </a:fontRef>
+        </p:style>
+        <p:txBody>
+          <a:bodyPr rtlCol="0" anchor="ctr"/>
+          <a:lstStyle/>
+          <a:p>
+            <a:pPr algn="ctr"/>
+            <a:endParaRPr lang="en-US"/>
+          </a:p>
+        </p:txBody>
+      </p:sp>
+    </p:spTree>
+    <p:extLst>
+      <p:ext uri="{BB962C8B-B14F-4D97-AF65-F5344CB8AC3E}">
+        <p14:creationId xmlns:p14="http://schemas.microsoft.com/office/powerpoint/2010/main" val="1288161037"/>
+      </p:ext>
+    </p:extLst>
+  </p:cSld>
+  <p:clrMapOvr>
+    <a:masterClrMapping/>
+  </p:clrMapOvr>
+</p:sld>
+</file>
+
+<file path=ppt/slides/slide6.xml><?xml version="1.0" encoding="utf-8"?>
+<p:sld xmlns:a="http://schemas.openxmlformats.org/drawingml/2006/main" xmlns:r="http://schemas.openxmlformats.org/officeDocument/2006/relationships" xmlns:p="http://schemas.openxmlformats.org/presentationml/2006/main">
+  <p:cSld>
+    <p:spTree>
+      <p:nvGrpSpPr>
+        <p:cNvPr id="1" name=""/>
+        <p:cNvGrpSpPr/>
+        <p:nvPr/>
+      </p:nvGrpSpPr>
+      <p:grpSpPr>
+        <a:xfrm>
+          <a:off x="0" y="0"/>
+          <a:ext cx="0" cy="0"/>
+          <a:chOff x="0" y="0"/>
+          <a:chExt cx="0" cy="0"/>
+        </a:xfrm>
+      </p:grpSpPr>
+      <p:sp>
+        <p:nvSpPr>
+          <p:cNvPr id="2" name="Title 1">
+            <a:extLst>
+              <a:ext uri="{FF2B5EF4-FFF2-40B4-BE49-F238E27FC236}">
+                <a16:creationId xmlns:a16="http://schemas.microsoft.com/office/drawing/2014/main" id="{A112A3A2-717A-6743-AD24-6CD9DD2AAF99}"/>
+              </a:ext>
+            </a:extLst>
+          </p:cNvPr>
+          <p:cNvSpPr>
+            <a:spLocks noGrp="1"/>
+          </p:cNvSpPr>
+          <p:nvPr>
+            <p:ph type="title"/>
+          </p:nvPr>
+        </p:nvSpPr>
+        <p:spPr/>
+        <p:txBody>
+          <a:bodyPr/>
+          <a:lstStyle/>
+          <a:p>
+            <a:endParaRPr lang="en-US"/>
+          </a:p>
+        </p:txBody>
+      </p:sp>
+      <p:sp>
+        <p:nvSpPr>
+          <p:cNvPr id="3" name="Content Placeholder 2">
+            <a:extLst>
+              <a:ext uri="{FF2B5EF4-FFF2-40B4-BE49-F238E27FC236}">
+                <a16:creationId xmlns:a16="http://schemas.microsoft.com/office/drawing/2014/main" id="{E8AAFFB9-0E77-9F4F-8E6D-E6BEABC1DA5C}"/>
+              </a:ext>
+            </a:extLst>
+          </p:cNvPr>
+          <p:cNvSpPr>
+            <a:spLocks noGrp="1"/>
+          </p:cNvSpPr>
+          <p:nvPr>
+            <p:ph idx="1"/>
+          </p:nvPr>
+        </p:nvSpPr>
+        <p:spPr>
+          <a:xfrm>
+            <a:off x="7241059" y="1825625"/>
+            <a:ext cx="4112740" cy="4351338"/>
+          </a:xfrm>
+        </p:spPr>
+        <p:txBody>
+          <a:bodyPr/>
+          <a:lstStyle/>
+          <a:p>
+            <a:endParaRPr lang="en-US" dirty="0"/>
+          </a:p>
+        </p:txBody>
+      </p:sp>
+      <p:pic>
+        <p:nvPicPr>
+          <p:cNvPr id="4" name="Picture 3">
+            <a:extLst>
+              <a:ext uri="{FF2B5EF4-FFF2-40B4-BE49-F238E27FC236}">
+                <a16:creationId xmlns:a16="http://schemas.microsoft.com/office/drawing/2014/main" id="{BD1D381F-A30E-C64A-92F8-36BCBDF6442E}"/>
+              </a:ext>
+            </a:extLst>
+          </p:cNvPr>
+          <p:cNvPicPr>
+            <a:picLocks noChangeAspect="1"/>
+          </p:cNvPicPr>
+          <p:nvPr/>
+        </p:nvPicPr>
+        <p:blipFill>
+          <a:blip r:embed="rId2"/>
+          <a:stretch>
+            <a:fillRect/>
+          </a:stretch>
+        </p:blipFill>
+        <p:spPr>
+          <a:xfrm>
+            <a:off x="1931347" y="2242344"/>
+            <a:ext cx="2476500" cy="3517900"/>
+          </a:xfrm>
+          <a:prstGeom prst="rect">
+            <a:avLst/>
+          </a:prstGeom>
+        </p:spPr>
+      </p:pic>
+      <p:sp>
+        <p:nvSpPr>
+          <p:cNvPr id="5" name="Right Arrow 4">
+            <a:extLst>
+              <a:ext uri="{FF2B5EF4-FFF2-40B4-BE49-F238E27FC236}">
+                <a16:creationId xmlns:a16="http://schemas.microsoft.com/office/drawing/2014/main" id="{D84BA25F-B125-0D4F-83F1-39432A090590}"/>
+              </a:ext>
+            </a:extLst>
+          </p:cNvPr>
+          <p:cNvSpPr/>
+          <p:nvPr/>
+        </p:nvSpPr>
+        <p:spPr>
+          <a:xfrm rot="1313835">
+            <a:off x="1388980" y="4453672"/>
+            <a:ext cx="612238" cy="319388"/>
+          </a:xfrm>
+          <a:prstGeom prst="rightArrow">
+            <a:avLst/>
+          </a:prstGeom>
+          <a:solidFill>
+            <a:srgbClr val="FF0000"/>
+          </a:solidFill>
+          <a:ln>
+            <a:noFill/>
+          </a:ln>
+        </p:spPr>
+        <p:style>
+          <a:lnRef idx="2">
+            <a:schemeClr val="accent1">
+              <a:shade val="50000"/>
+            </a:schemeClr>
+          </a:lnRef>
+          <a:fillRef idx="1">
+            <a:schemeClr val="accent1"/>
+          </a:fillRef>
+          <a:effectRef idx="0">
+            <a:schemeClr val="accent1"/>
+          </a:effectRef>
+          <a:fontRef idx="minor">
+            <a:schemeClr val="lt1"/>
+          </a:fontRef>
+        </p:style>
+        <p:txBody>
+          <a:bodyPr rtlCol="0" anchor="ctr"/>
+          <a:lstStyle/>
+          <a:p>
+            <a:pPr algn="ctr"/>
+            <a:endParaRPr lang="en-US"/>
+          </a:p>
+        </p:txBody>
+      </p:sp>
+      <p:sp>
+        <p:nvSpPr>
+          <p:cNvPr id="6" name="Right Arrow 5">
+            <a:extLst>
+              <a:ext uri="{FF2B5EF4-FFF2-40B4-BE49-F238E27FC236}">
+                <a16:creationId xmlns:a16="http://schemas.microsoft.com/office/drawing/2014/main" id="{AD0F8EC4-5758-4E47-9F10-832CF8D4D212}"/>
+              </a:ext>
+            </a:extLst>
+          </p:cNvPr>
+          <p:cNvSpPr/>
+          <p:nvPr/>
+        </p:nvSpPr>
+        <p:spPr>
+          <a:xfrm rot="9657148">
+            <a:off x="3760254" y="3452197"/>
+            <a:ext cx="612238" cy="319388"/>
+          </a:xfrm>
+          <a:prstGeom prst="rightArrow">
+            <a:avLst/>
+          </a:prstGeom>
+          <a:solidFill>
+            <a:srgbClr val="FF0000"/>
+          </a:solidFill>
+          <a:ln>
+            <a:noFill/>
+          </a:ln>
+        </p:spPr>
+        <p:style>
+          <a:lnRef idx="2">
+            <a:schemeClr val="accent1">
+              <a:shade val="50000"/>
+            </a:schemeClr>
+          </a:lnRef>
+          <a:fillRef idx="1">
+            <a:schemeClr val="accent1"/>
+          </a:fillRef>
+          <a:effectRef idx="0">
+            <a:schemeClr val="accent1"/>
+          </a:effectRef>
+          <a:fontRef idx="minor">
+            <a:schemeClr val="lt1"/>
+          </a:fontRef>
+        </p:style>
+        <p:txBody>
+          <a:bodyPr rtlCol="0" anchor="ctr"/>
+          <a:lstStyle/>
+          <a:p>
+            <a:pPr algn="ctr"/>
+            <a:endParaRPr lang="en-US"/>
+          </a:p>
+        </p:txBody>
+      </p:sp>
+      <p:sp>
+        <p:nvSpPr>
+          <p:cNvPr id="7" name="TextBox 6">
+            <a:extLst>
+              <a:ext uri="{FF2B5EF4-FFF2-40B4-BE49-F238E27FC236}">
+                <a16:creationId xmlns:a16="http://schemas.microsoft.com/office/drawing/2014/main" id="{83306991-5517-E04D-A070-35A445B2C4C5}"/>
+              </a:ext>
+            </a:extLst>
+          </p:cNvPr>
+          <p:cNvSpPr txBox="1"/>
+          <p:nvPr/>
+        </p:nvSpPr>
+        <p:spPr>
+          <a:xfrm>
+            <a:off x="554620" y="3487977"/>
+            <a:ext cx="994439" cy="923330"/>
+          </a:xfrm>
+          <a:prstGeom prst="rect">
+            <a:avLst/>
+          </a:prstGeom>
+          <a:noFill/>
+        </p:spPr>
+        <p:txBody>
+          <a:bodyPr wrap="none" rtlCol="0">
+            <a:spAutoFit/>
+          </a:bodyPr>
+          <a:lstStyle/>
+          <a:p>
+            <a:r>
+              <a:rPr lang="en-US" dirty="0">
+                <a:solidFill>
+                  <a:srgbClr val="FF0000"/>
+                </a:solidFill>
+              </a:rPr>
+              <a:t>Click</a:t>
+            </a:r>
+          </a:p>
+          <a:p>
+            <a:r>
+              <a:rPr lang="en-US" dirty="0">
+                <a:solidFill>
+                  <a:srgbClr val="FF0000"/>
+                </a:solidFill>
+              </a:rPr>
+              <a:t>Here For</a:t>
+            </a:r>
+          </a:p>
+          <a:p>
+            <a:r>
+              <a:rPr lang="en-US" dirty="0">
+                <a:solidFill>
+                  <a:srgbClr val="FF0000"/>
+                </a:solidFill>
+              </a:rPr>
+              <a:t>Controls</a:t>
+            </a:r>
+          </a:p>
+        </p:txBody>
+      </p:sp>
+      <p:sp>
+        <p:nvSpPr>
+          <p:cNvPr id="8" name="TextBox 7">
+            <a:extLst>
+              <a:ext uri="{FF2B5EF4-FFF2-40B4-BE49-F238E27FC236}">
+                <a16:creationId xmlns:a16="http://schemas.microsoft.com/office/drawing/2014/main" id="{F1BEFEE3-2F13-954B-B8EE-39BE5E2543EA}"/>
+              </a:ext>
+            </a:extLst>
+          </p:cNvPr>
+          <p:cNvSpPr txBox="1"/>
+          <p:nvPr/>
+        </p:nvSpPr>
+        <p:spPr>
+          <a:xfrm>
+            <a:off x="4534385" y="2814324"/>
+            <a:ext cx="1827167" cy="1200329"/>
+          </a:xfrm>
+          <a:prstGeom prst="rect">
+            <a:avLst/>
+          </a:prstGeom>
+          <a:noFill/>
+        </p:spPr>
+        <p:txBody>
+          <a:bodyPr wrap="none" rtlCol="0">
+            <a:spAutoFit/>
+          </a:bodyPr>
+          <a:lstStyle/>
+          <a:p>
+            <a:r>
+              <a:rPr lang="en-US" dirty="0">
+                <a:solidFill>
+                  <a:srgbClr val="FF0000"/>
+                </a:solidFill>
+              </a:rPr>
+              <a:t>Use the</a:t>
+            </a:r>
+          </a:p>
+          <a:p>
+            <a:r>
+              <a:rPr lang="en-US" dirty="0">
+                <a:solidFill>
+                  <a:srgbClr val="FF0000"/>
+                </a:solidFill>
+              </a:rPr>
+              <a:t>“repeat” control</a:t>
+            </a:r>
+          </a:p>
+          <a:p>
+            <a:r>
+              <a:rPr lang="en-US" dirty="0">
+                <a:solidFill>
+                  <a:srgbClr val="FF0000"/>
+                </a:solidFill>
+              </a:rPr>
+              <a:t>and change index</a:t>
+            </a:r>
+          </a:p>
+          <a:p>
+            <a:r>
+              <a:rPr lang="en-US" dirty="0">
+                <a:solidFill>
+                  <a:srgbClr val="FF0000"/>
+                </a:solidFill>
+              </a:rPr>
+              <a:t>counter to 4</a:t>
+            </a:r>
+          </a:p>
+        </p:txBody>
+      </p:sp>
+    </p:spTree>
+    <p:extLst>
+      <p:ext uri="{BB962C8B-B14F-4D97-AF65-F5344CB8AC3E}">
+        <p14:creationId xmlns:p14="http://schemas.microsoft.com/office/powerpoint/2010/main" val="2965668358"/>
       </p:ext>
     </p:extLst>
   </p:cSld>

</xml_diff>